<commit_message>
remove wadapps in overview schematic
</commit_message>
<xml_diff>
--- a/KernelDeveloperGuide/pptx/overview.pptx
+++ b/KernelDeveloperGuide/pptx/overview.pptx
@@ -5524,16 +5524,9 @@
             <a:pPr algn="ctr"/>
             <a:r>
               <a:rPr lang="en-US" dirty="0" smtClean="0"/>
-              <a:t>Application Framework (e.g. </a:t>
-            </a:r>
-            <a:r>
-              <a:rPr lang="en-US" dirty="0" err="1" smtClean="0"/>
-              <a:t>Wadapps</a:t>
-            </a:r>
-            <a:r>
-              <a:rPr lang="en-US" dirty="0" smtClean="0"/>
-              <a:t>)</a:t>
-            </a:r>
+              <a:t>Kernel Application Framework</a:t>
+            </a:r>
+            <a:endParaRPr lang="en-US" dirty="0" smtClean="0"/>
           </a:p>
         </p:txBody>
       </p:sp>
@@ -6035,8 +6028,9 @@
             <a:pPr algn="ctr"/>
             <a:r>
               <a:rPr lang="en-US" sz="1200" dirty="0" smtClean="0"/>
-              <a:t>Resident</a:t>
-            </a:r>
+              <a:t>System</a:t>
+            </a:r>
+            <a:endParaRPr lang="en-US" sz="1200" dirty="0" smtClean="0"/>
           </a:p>
           <a:p>
             <a:pPr algn="ctr"/>

</xml_diff>

<commit_message>
update overview with glossary terms
</commit_message>
<xml_diff>
--- a/KernelDeveloperGuide/pptx/overview.pptx
+++ b/KernelDeveloperGuide/pptx/overview.pptx
@@ -721,10 +721,9 @@
           <a:lstStyle/>
           <a:p>
             <a:r>
-              <a:rPr lang="en-US" smtClean="0"/>
+              <a:rPr lang="en-US"/>
               <a:t>October 2015</a:t>
             </a:r>
-            <a:endParaRPr lang="en-US"/>
           </a:p>
         </p:txBody>
       </p:sp>
@@ -4691,7 +4690,7 @@
           <a:p>
             <a:pPr algn="ctr"/>
             <a:r>
-              <a:rPr lang="en-US" dirty="0" smtClean="0"/>
+              <a:rPr lang="en-US" dirty="0"/>
               <a:t>Foundation Libraries</a:t>
             </a:r>
           </a:p>
@@ -4713,7 +4712,7 @@
           <a:lstStyle/>
           <a:p>
             <a:r>
-              <a:rPr lang="fr-FR" smtClean="0"/>
+              <a:rPr lang="fr-FR"/>
               <a:t>Apr. 17</a:t>
             </a:r>
             <a:endParaRPr lang="en-US" dirty="0"/>
@@ -4762,10 +4761,9 @@
           <a:lstStyle/>
           <a:p>
             <a:r>
-              <a:rPr lang="en-US" sz="2000" dirty="0" smtClean="0"/>
+              <a:rPr lang="en-US" sz="2000" dirty="0"/>
               <a:t>Overall Architecture</a:t>
             </a:r>
-            <a:endParaRPr lang="en-US" sz="2000" dirty="0"/>
           </a:p>
         </p:txBody>
       </p:sp>
@@ -4805,10 +4803,9 @@
           <a:p>
             <a:pPr algn="ctr"/>
             <a:r>
-              <a:rPr lang="en-US" dirty="0" smtClean="0"/>
+              <a:rPr lang="en-US" dirty="0"/>
               <a:t>Target</a:t>
             </a:r>
-            <a:endParaRPr lang="en-US" dirty="0"/>
           </a:p>
         </p:txBody>
       </p:sp>
@@ -4848,10 +4845,9 @@
           <a:p>
             <a:pPr algn="ctr"/>
             <a:r>
-              <a:rPr lang="en-US" dirty="0" smtClean="0"/>
+              <a:rPr lang="en-US" dirty="0"/>
               <a:t>BSP / Drivers</a:t>
             </a:r>
-            <a:endParaRPr lang="en-US" dirty="0"/>
           </a:p>
         </p:txBody>
       </p:sp>
@@ -4891,7 +4887,7 @@
           <a:p>
             <a:pPr algn="ctr"/>
             <a:r>
-              <a:rPr lang="en-US" dirty="0" smtClean="0"/>
+              <a:rPr lang="en-US" dirty="0"/>
               <a:t>Legacy Libraries</a:t>
             </a:r>
           </a:p>
@@ -4933,7 +4929,7 @@
           <a:p>
             <a:pPr algn="ctr"/>
             <a:r>
-              <a:rPr lang="en-US" dirty="0" smtClean="0"/>
+              <a:rPr lang="en-US" dirty="0"/>
               <a:t>Core Engine</a:t>
             </a:r>
           </a:p>
@@ -4975,7 +4971,7 @@
           <a:p>
             <a:pPr algn="ctr"/>
             <a:r>
-              <a:rPr lang="en-US" dirty="0" smtClean="0"/>
+              <a:rPr lang="en-US" dirty="0"/>
               <a:t>Foundation Libraries</a:t>
             </a:r>
           </a:p>
@@ -5017,7 +5013,7 @@
           <a:p>
             <a:pPr algn="ctr"/>
             <a:r>
-              <a:rPr lang="en-US" dirty="0" smtClean="0"/>
+              <a:rPr lang="en-US" dirty="0"/>
               <a:t>Foundation Libraries</a:t>
             </a:r>
           </a:p>
@@ -5059,7 +5055,7 @@
           <a:p>
             <a:pPr algn="ctr"/>
             <a:r>
-              <a:rPr lang="en-US" dirty="0" smtClean="0"/>
+              <a:rPr lang="en-US" dirty="0"/>
               <a:t>Foundation Libraries</a:t>
             </a:r>
           </a:p>
@@ -5101,7 +5097,7 @@
           <a:p>
             <a:pPr algn="ctr"/>
             <a:r>
-              <a:rPr lang="en-US" dirty="0" smtClean="0"/>
+              <a:rPr lang="en-US" dirty="0"/>
               <a:t>Foundation Libraries</a:t>
             </a:r>
           </a:p>
@@ -5143,12 +5139,8 @@
           <a:p>
             <a:pPr algn="ctr"/>
             <a:r>
-              <a:rPr lang="en-US" dirty="0" smtClean="0"/>
-              <a:t>Add-on </a:t>
-            </a:r>
-            <a:r>
               <a:rPr lang="en-US" dirty="0"/>
-              <a:t>Libraries</a:t>
+              <a:t>Add-On Libraries</a:t>
             </a:r>
           </a:p>
         </p:txBody>
@@ -5189,10 +5181,9 @@
           <a:p>
             <a:pPr algn="ctr"/>
             <a:r>
-              <a:rPr lang="en-US" dirty="0" smtClean="0"/>
+              <a:rPr lang="en-US" dirty="0"/>
               <a:t>Kernel Application &amp; Framework</a:t>
             </a:r>
-            <a:endParaRPr lang="en-US" dirty="0" smtClean="0"/>
           </a:p>
         </p:txBody>
       </p:sp>
@@ -5232,7 +5223,7 @@
           <a:p>
             <a:pPr algn="ctr"/>
             <a:r>
-              <a:rPr lang="en-US" dirty="0" smtClean="0"/>
+              <a:rPr lang="en-US" dirty="0"/>
               <a:t>Legacy Libraries</a:t>
             </a:r>
           </a:p>
@@ -5274,8 +5265,8 @@
           <a:p>
             <a:pPr algn="ctr"/>
             <a:r>
-              <a:rPr lang="en-US" dirty="0" smtClean="0"/>
-              <a:t>C Libraries</a:t>
+              <a:rPr lang="en-US" dirty="0"/>
+              <a:t>Native Libraries</a:t>
             </a:r>
           </a:p>
         </p:txBody>
@@ -5320,7 +5311,7 @@
           <a:p>
             <a:pPr algn="ctr"/>
             <a:r>
-              <a:rPr lang="en-US" sz="1400" smtClean="0"/>
+              <a:rPr lang="en-US" sz="1400"/>
               <a:t>Kernel</a:t>
             </a:r>
             <a:endParaRPr lang="en-US" sz="1400" dirty="0"/>
@@ -5367,10 +5358,9 @@
           <a:p>
             <a:pPr algn="ctr"/>
             <a:r>
-              <a:rPr lang="en-US" sz="1400" dirty="0" smtClean="0"/>
+              <a:rPr lang="en-US" sz="1400" dirty="0"/>
               <a:t>Apps</a:t>
             </a:r>
-            <a:endParaRPr lang="en-US" sz="1400" dirty="0"/>
           </a:p>
         </p:txBody>
       </p:sp>
@@ -5410,14 +5400,14 @@
           <a:p>
             <a:pPr algn="ctr"/>
             <a:r>
-              <a:rPr lang="en-US" sz="1200" dirty="0" smtClean="0"/>
+              <a:rPr lang="en-US" sz="1200" dirty="0"/>
               <a:t>Downloaded</a:t>
             </a:r>
           </a:p>
           <a:p>
             <a:pPr algn="ctr"/>
             <a:r>
-              <a:rPr lang="en-US" sz="1200" dirty="0" smtClean="0"/>
+              <a:rPr lang="en-US" sz="1200" dirty="0"/>
               <a:t>Applications</a:t>
             </a:r>
           </a:p>
@@ -5459,14 +5449,14 @@
           <a:p>
             <a:pPr algn="ctr"/>
             <a:r>
-              <a:rPr lang="en-US" sz="1200" dirty="0" smtClean="0"/>
+              <a:rPr lang="en-US" sz="1200" dirty="0"/>
               <a:t>Downloaded</a:t>
             </a:r>
           </a:p>
           <a:p>
             <a:pPr algn="ctr"/>
             <a:r>
-              <a:rPr lang="en-US" sz="1200" dirty="0" smtClean="0"/>
+              <a:rPr lang="en-US" sz="1200" dirty="0"/>
               <a:t>Applications</a:t>
             </a:r>
           </a:p>
@@ -5508,14 +5498,14 @@
           <a:p>
             <a:pPr algn="ctr"/>
             <a:r>
-              <a:rPr lang="en-US" sz="1200" dirty="0" smtClean="0"/>
+              <a:rPr lang="en-US" sz="1200" dirty="0"/>
               <a:t>Downloaded</a:t>
             </a:r>
           </a:p>
           <a:p>
             <a:pPr algn="ctr"/>
             <a:r>
-              <a:rPr lang="en-US" sz="1200" dirty="0" smtClean="0"/>
+              <a:rPr lang="en-US" sz="1200" dirty="0"/>
               <a:t>Applications</a:t>
             </a:r>
           </a:p>
@@ -5557,14 +5547,14 @@
           <a:p>
             <a:pPr algn="ctr"/>
             <a:r>
-              <a:rPr lang="en-US" sz="1200" dirty="0" smtClean="0"/>
+              <a:rPr lang="en-US" sz="1200" dirty="0"/>
               <a:t>Downloaded</a:t>
             </a:r>
           </a:p>
           <a:p>
             <a:pPr algn="ctr"/>
             <a:r>
-              <a:rPr lang="en-US" sz="1200" dirty="0" smtClean="0"/>
+              <a:rPr lang="en-US" sz="1200" dirty="0"/>
               <a:t>Applications</a:t>
             </a:r>
           </a:p>
@@ -5606,14 +5596,14 @@
           <a:p>
             <a:pPr algn="ctr"/>
             <a:r>
-              <a:rPr lang="en-US" sz="1200" dirty="0" smtClean="0"/>
+              <a:rPr lang="en-US" sz="1200" dirty="0"/>
               <a:t>Downloaded</a:t>
             </a:r>
           </a:p>
           <a:p>
             <a:pPr algn="ctr"/>
             <a:r>
-              <a:rPr lang="en-US" sz="1200" dirty="0" smtClean="0"/>
+              <a:rPr lang="en-US" sz="1200" dirty="0"/>
               <a:t>Applications</a:t>
             </a:r>
           </a:p>
@@ -5655,15 +5645,14 @@
           <a:p>
             <a:pPr algn="ctr"/>
             <a:r>
-              <a:rPr lang="en-US" sz="1200" dirty="0" smtClean="0"/>
+              <a:rPr lang="en-US" sz="1200" dirty="0"/>
               <a:t>Pre-installed</a:t>
             </a:r>
-            <a:endParaRPr lang="en-US" sz="1200" dirty="0" smtClean="0"/>
           </a:p>
           <a:p>
             <a:pPr algn="ctr"/>
             <a:r>
-              <a:rPr lang="en-US" sz="1200" dirty="0" smtClean="0"/>
+              <a:rPr lang="en-US" sz="1200" dirty="0"/>
               <a:t>Applications</a:t>
             </a:r>
           </a:p>
@@ -5709,10 +5698,9 @@
           <a:p>
             <a:pPr algn="ctr"/>
             <a:r>
-              <a:rPr lang="en-US" sz="1400" dirty="0" smtClean="0"/>
-              <a:t>Platform</a:t>
-            </a:r>
-            <a:endParaRPr lang="en-US" sz="1400" dirty="0"/>
+              <a:rPr lang="en-US" sz="1400" dirty="0"/>
+              <a:t>VEE Port</a:t>
+            </a:r>
           </a:p>
         </p:txBody>
       </p:sp>
@@ -5726,13 +5714,6 @@
   <p:clrMapOvr>
     <a:masterClrMapping/>
   </p:clrMapOvr>
-  <p:timing>
-    <p:tnLst>
-      <p:par>
-        <p:cTn id="1" dur="indefinite" restart="never" nodeType="tmRoot"/>
-      </p:par>
-    </p:tnLst>
-  </p:timing>
 </p:sld>
 </file>
 

</xml_diff>

<commit_message>
Remove pre-installed applications from Kernel Dev Guide overview diagram
</commit_message>
<xml_diff>
--- a/KernelDeveloperGuide/pptx/overview.pptx
+++ b/KernelDeveloperGuide/pptx/overview.pptx
@@ -4712,8 +4712,12 @@
           <a:lstStyle/>
           <a:p>
             <a:r>
-              <a:rPr lang="fr-FR"/>
-              <a:t>Apr. 17</a:t>
+              <a:rPr lang="fr-FR" dirty="0" err="1"/>
+              <a:t>Dec</a:t>
+            </a:r>
+            <a:r>
+              <a:rPr lang="fr-FR" dirty="0"/>
+              <a:t>. 2024</a:t>
             </a:r>
             <a:endParaRPr lang="en-US" dirty="0"/>
           </a:p>
@@ -5372,8 +5376,8 @@
         </p:nvSpPr>
         <p:spPr>
           <a:xfrm>
-            <a:off x="4770308" y="1267999"/>
-            <a:ext cx="2444269" cy="683312"/>
+            <a:off x="1907704" y="1268760"/>
+            <a:ext cx="5309658" cy="683312"/>
           </a:xfrm>
           <a:prstGeom prst="roundRect">
             <a:avLst/>
@@ -5421,8 +5425,8 @@
         </p:nvSpPr>
         <p:spPr>
           <a:xfrm>
-            <a:off x="4654394" y="1339190"/>
-            <a:ext cx="2497861" cy="683312"/>
+            <a:off x="1842598" y="1339190"/>
+            <a:ext cx="5309658" cy="683312"/>
           </a:xfrm>
           <a:prstGeom prst="roundRect">
             <a:avLst/>
@@ -5470,8 +5474,8 @@
         </p:nvSpPr>
         <p:spPr>
           <a:xfrm>
-            <a:off x="4588060" y="1415363"/>
-            <a:ext cx="2497861" cy="683312"/>
+            <a:off x="1776264" y="1415363"/>
+            <a:ext cx="5309658" cy="683312"/>
           </a:xfrm>
           <a:prstGeom prst="roundRect">
             <a:avLst/>
@@ -5496,165 +5500,46 @@
           <a:bodyPr rtlCol="0" anchor="ctr"/>
           <a:lstStyle/>
           <a:p>
-            <a:pPr algn="ctr"/>
-            <a:r>
-              <a:rPr lang="en-US" sz="1200" dirty="0"/>
-              <a:t>Downloaded</a:t>
-            </a:r>
-          </a:p>
-          <a:p>
-            <a:pPr algn="ctr"/>
-            <a:r>
-              <a:rPr lang="en-US" sz="1200" dirty="0"/>
-              <a:t>Applications</a:t>
-            </a:r>
-          </a:p>
-        </p:txBody>
-      </p:sp>
-      <p:sp>
-        <p:nvSpPr>
-          <p:cNvPr id="42" name="Rounded Rectangle 41"/>
-          <p:cNvSpPr/>
-          <p:nvPr/>
-        </p:nvSpPr>
-        <p:spPr>
-          <a:xfrm>
-            <a:off x="1962696" y="1264690"/>
-            <a:ext cx="2444269" cy="683312"/>
-          </a:xfrm>
-          <a:prstGeom prst="roundRect">
-            <a:avLst/>
-          </a:prstGeom>
-          <a:ln/>
-        </p:spPr>
-        <p:style>
-          <a:lnRef idx="2">
-            <a:schemeClr val="dk1"/>
-          </a:lnRef>
-          <a:fillRef idx="1">
-            <a:schemeClr val="lt1"/>
-          </a:fillRef>
-          <a:effectRef idx="0">
-            <a:schemeClr val="dk1"/>
-          </a:effectRef>
-          <a:fontRef idx="minor">
-            <a:schemeClr val="dk1"/>
-          </a:fontRef>
-        </p:style>
-        <p:txBody>
-          <a:bodyPr rtlCol="0" anchor="ctr"/>
-          <a:lstStyle/>
-          <a:p>
-            <a:pPr algn="ctr"/>
-            <a:r>
-              <a:rPr lang="en-US" sz="1200" dirty="0"/>
-              <a:t>Downloaded</a:t>
-            </a:r>
-          </a:p>
-          <a:p>
-            <a:pPr algn="ctr"/>
-            <a:r>
-              <a:rPr lang="en-US" sz="1200" dirty="0"/>
-              <a:t>Applications</a:t>
-            </a:r>
-          </a:p>
-        </p:txBody>
-      </p:sp>
-      <p:sp>
-        <p:nvSpPr>
-          <p:cNvPr id="43" name="Rounded Rectangle 42"/>
-          <p:cNvSpPr/>
-          <p:nvPr/>
-        </p:nvSpPr>
-        <p:spPr>
-          <a:xfrm>
-            <a:off x="1846782" y="1335881"/>
-            <a:ext cx="2497861" cy="683312"/>
-          </a:xfrm>
-          <a:prstGeom prst="roundRect">
-            <a:avLst/>
-          </a:prstGeom>
-          <a:ln/>
-        </p:spPr>
-        <p:style>
-          <a:lnRef idx="2">
-            <a:schemeClr val="dk1"/>
-          </a:lnRef>
-          <a:fillRef idx="1">
-            <a:schemeClr val="lt1"/>
-          </a:fillRef>
-          <a:effectRef idx="0">
-            <a:schemeClr val="dk1"/>
-          </a:effectRef>
-          <a:fontRef idx="minor">
-            <a:schemeClr val="dk1"/>
-          </a:fontRef>
-        </p:style>
-        <p:txBody>
-          <a:bodyPr rtlCol="0" anchor="ctr"/>
-          <a:lstStyle/>
-          <a:p>
-            <a:pPr algn="ctr"/>
-            <a:r>
-              <a:rPr lang="en-US" sz="1200" dirty="0"/>
-              <a:t>Downloaded</a:t>
-            </a:r>
-          </a:p>
-          <a:p>
-            <a:pPr algn="ctr"/>
-            <a:r>
-              <a:rPr lang="en-US" sz="1200" dirty="0"/>
-              <a:t>Applications</a:t>
-            </a:r>
-          </a:p>
-        </p:txBody>
-      </p:sp>
-      <p:sp>
-        <p:nvSpPr>
-          <p:cNvPr id="44" name="Rounded Rectangle 43"/>
-          <p:cNvSpPr/>
-          <p:nvPr/>
-        </p:nvSpPr>
-        <p:spPr>
-          <a:xfrm>
-            <a:off x="1780448" y="1412054"/>
-            <a:ext cx="2497861" cy="683312"/>
-          </a:xfrm>
-          <a:prstGeom prst="roundRect">
-            <a:avLst/>
-          </a:prstGeom>
-          <a:ln/>
-        </p:spPr>
-        <p:style>
-          <a:lnRef idx="2">
-            <a:schemeClr val="dk1"/>
-          </a:lnRef>
-          <a:fillRef idx="1">
-            <a:schemeClr val="lt1"/>
-          </a:fillRef>
-          <a:effectRef idx="0">
-            <a:schemeClr val="dk1"/>
-          </a:effectRef>
-          <a:fontRef idx="minor">
-            <a:schemeClr val="dk1"/>
-          </a:fontRef>
-        </p:style>
-        <p:txBody>
-          <a:bodyPr rtlCol="0" anchor="ctr"/>
-          <a:lstStyle/>
-          <a:p>
-            <a:pPr algn="ctr"/>
-            <a:r>
-              <a:rPr lang="en-US" sz="1200" dirty="0"/>
-              <a:t>Pre-installed</a:t>
-            </a:r>
-          </a:p>
-          <a:p>
-            <a:pPr algn="ctr"/>
-            <a:r>
-              <a:rPr lang="en-US" sz="1200" dirty="0"/>
-              <a:t>Applications</a:t>
-            </a:r>
+            <a:pPr marL="0" marR="0" lvl="0" indent="0" algn="ctr" defTabSz="914400" rtl="0" eaLnBrk="1" fontAlgn="auto" latinLnBrk="0" hangingPunct="1">
+              <a:lnSpc>
+                <a:spcPct val="100000"/>
+              </a:lnSpc>
+              <a:spcBef>
+                <a:spcPts val="0"/>
+              </a:spcBef>
+              <a:spcAft>
+                <a:spcPts val="0"/>
+              </a:spcAft>
+              <a:buClrTx/>
+              <a:buSzTx/>
+              <a:buFontTx/>
+              <a:buNone/>
+              <a:tabLst/>
+              <a:defRPr/>
+            </a:pPr>
+            <a:r>
+              <a:rPr lang="en-US" dirty="0">
+                <a:solidFill>
+                  <a:srgbClr val="4B5357"/>
+                </a:solidFill>
+                <a:latin typeface="Calibri Light"/>
+              </a:rPr>
+              <a:t>Sandboxed Applications</a:t>
+            </a:r>
+            <a:endParaRPr kumimoji="0" lang="en-US" sz="1800" b="0" i="0" u="none" strike="noStrike" kern="1200" cap="none" spc="0" normalizeH="0" baseline="0" noProof="0" dirty="0">
+              <a:ln>
+                <a:noFill/>
+              </a:ln>
+              <a:solidFill>
+                <a:srgbClr val="4B5357"/>
+              </a:solidFill>
+              <a:effectLst/>
+              <a:uLnTx/>
+              <a:uFillTx/>
+              <a:latin typeface="Calibri Light"/>
+              <a:ea typeface="+mn-ea"/>
+              <a:cs typeface="+mn-cs"/>
+            </a:endParaRPr>
           </a:p>
         </p:txBody>
       </p:sp>

</xml_diff>